<commit_message>
minor modifications of presentations
</commit_message>
<xml_diff>
--- a/presentations/pptx/02_The_MeteoSwiss_Py-ART.pptx
+++ b/presentations/pptx/02_The_MeteoSwiss_Py-ART.pptx
@@ -5,10 +5,10 @@
     <p:sldMasterId id="2147483726" r:id="rId4"/>
   </p:sldMasterIdLst>
   <p:notesMasterIdLst>
-    <p:notesMasterId r:id="rId34"/>
+    <p:notesMasterId r:id="rId37"/>
   </p:notesMasterIdLst>
   <p:handoutMasterIdLst>
-    <p:handoutMasterId r:id="rId35"/>
+    <p:handoutMasterId r:id="rId38"/>
   </p:handoutMasterIdLst>
   <p:sldIdLst>
     <p:sldId id="326" r:id="rId5"/>
@@ -21,25 +21,28 @@
     <p:sldId id="411" r:id="rId12"/>
     <p:sldId id="412" r:id="rId13"/>
     <p:sldId id="413" r:id="rId14"/>
-    <p:sldId id="414" r:id="rId15"/>
-    <p:sldId id="415" r:id="rId16"/>
-    <p:sldId id="416" r:id="rId17"/>
-    <p:sldId id="417" r:id="rId18"/>
-    <p:sldId id="418" r:id="rId19"/>
-    <p:sldId id="419" r:id="rId20"/>
-    <p:sldId id="420" r:id="rId21"/>
-    <p:sldId id="421" r:id="rId22"/>
-    <p:sldId id="422" r:id="rId23"/>
-    <p:sldId id="423" r:id="rId24"/>
-    <p:sldId id="424" r:id="rId25"/>
-    <p:sldId id="425" r:id="rId26"/>
-    <p:sldId id="426" r:id="rId27"/>
-    <p:sldId id="427" r:id="rId28"/>
-    <p:sldId id="428" r:id="rId29"/>
-    <p:sldId id="429" r:id="rId30"/>
-    <p:sldId id="430" r:id="rId31"/>
-    <p:sldId id="299" r:id="rId32"/>
-    <p:sldId id="375" r:id="rId33"/>
+    <p:sldId id="436" r:id="rId15"/>
+    <p:sldId id="437" r:id="rId16"/>
+    <p:sldId id="299" r:id="rId17"/>
+    <p:sldId id="375" r:id="rId18"/>
+    <p:sldId id="431" r:id="rId19"/>
+    <p:sldId id="414" r:id="rId20"/>
+    <p:sldId id="415" r:id="rId21"/>
+    <p:sldId id="416" r:id="rId22"/>
+    <p:sldId id="417" r:id="rId23"/>
+    <p:sldId id="418" r:id="rId24"/>
+    <p:sldId id="419" r:id="rId25"/>
+    <p:sldId id="420" r:id="rId26"/>
+    <p:sldId id="421" r:id="rId27"/>
+    <p:sldId id="422" r:id="rId28"/>
+    <p:sldId id="423" r:id="rId29"/>
+    <p:sldId id="424" r:id="rId30"/>
+    <p:sldId id="425" r:id="rId31"/>
+    <p:sldId id="426" r:id="rId32"/>
+    <p:sldId id="427" r:id="rId33"/>
+    <p:sldId id="428" r:id="rId34"/>
+    <p:sldId id="429" r:id="rId35"/>
+    <p:sldId id="430" r:id="rId36"/>
   </p:sldIdLst>
   <p:sldSz cx="9144000" cy="5143500" type="screen16x9"/>
   <p:notesSz cx="7023100" cy="9309100"/>
@@ -3701,7 +3704,7 @@
     </p:spTree>
     <p:extLst>
       <p:ext uri="{BB962C8B-B14F-4D97-AF65-F5344CB8AC3E}">
-        <p14:creationId xmlns:p14="http://schemas.microsoft.com/office/powerpoint/2010/main" val="2597964807"/>
+        <p14:creationId xmlns:p14="http://schemas.microsoft.com/office/powerpoint/2010/main" val="2729371493"/>
       </p:ext>
     </p:extLst>
   </p:cSld>
@@ -4579,6 +4582,1202 @@
       </p:grpSpPr>
       <p:sp>
         <p:nvSpPr>
+          <p:cNvPr id="2" name="Espace réservé du texte 1">
+            <a:extLst>
+              <a:ext uri="{FF2B5EF4-FFF2-40B4-BE49-F238E27FC236}">
+                <a16:creationId xmlns:a16="http://schemas.microsoft.com/office/drawing/2014/main" id="{E6003854-CC73-091A-40A2-CEED7CC64677}"/>
+              </a:ext>
+            </a:extLst>
+          </p:cNvPr>
+          <p:cNvSpPr>
+            <a:spLocks noGrp="1"/>
+          </p:cNvSpPr>
+          <p:nvPr>
+            <p:ph type="body" sz="quarter" idx="15"/>
+          </p:nvPr>
+        </p:nvSpPr>
+        <p:spPr/>
+        <p:txBody>
+          <a:bodyPr/>
+          <a:lstStyle/>
+          <a:p>
+            <a:endParaRPr lang="fr-FR"/>
+          </a:p>
+        </p:txBody>
+      </p:sp>
+      <p:sp>
+        <p:nvSpPr>
+          <p:cNvPr id="3" name="Titre 2">
+            <a:extLst>
+              <a:ext uri="{FF2B5EF4-FFF2-40B4-BE49-F238E27FC236}">
+                <a16:creationId xmlns:a16="http://schemas.microsoft.com/office/drawing/2014/main" id="{A121A44B-BE4E-E2FD-9DCF-C1E4FC5E4D84}"/>
+              </a:ext>
+            </a:extLst>
+          </p:cNvPr>
+          <p:cNvSpPr>
+            <a:spLocks noGrp="1"/>
+          </p:cNvSpPr>
+          <p:nvPr>
+            <p:ph type="title"/>
+          </p:nvPr>
+        </p:nvSpPr>
+        <p:spPr/>
+        <p:txBody>
+          <a:bodyPr/>
+          <a:lstStyle/>
+          <a:p>
+            <a:r>
+              <a:rPr lang="fr-FR" dirty="0"/>
+              <a:t>Basic data </a:t>
+            </a:r>
+            <a:r>
+              <a:rPr lang="fr-FR" dirty="0" err="1"/>
+              <a:t>processing</a:t>
+            </a:r>
+            <a:endParaRPr lang="fr-FR" dirty="0"/>
+          </a:p>
+        </p:txBody>
+      </p:sp>
+      <p:graphicFrame>
+        <p:nvGraphicFramePr>
+          <p:cNvPr id="4" name="Tableau 4">
+            <a:extLst>
+              <a:ext uri="{FF2B5EF4-FFF2-40B4-BE49-F238E27FC236}">
+                <a16:creationId xmlns:a16="http://schemas.microsoft.com/office/drawing/2014/main" id="{7C0938DE-6AA1-B51E-94A2-2F3DA664DBB7}"/>
+              </a:ext>
+            </a:extLst>
+          </p:cNvPr>
+          <p:cNvGraphicFramePr>
+            <a:graphicFrameLocks noGrp="1"/>
+          </p:cNvGraphicFramePr>
+          <p:nvPr>
+            <p:extLst>
+              <p:ext uri="{D42A27DB-BD31-4B8C-83A1-F6EECF244321}">
+                <p14:modId xmlns:p14="http://schemas.microsoft.com/office/powerpoint/2010/main" val="3997445536"/>
+              </p:ext>
+            </p:extLst>
+          </p:nvPr>
+        </p:nvGraphicFramePr>
+        <p:xfrm>
+          <a:off x="1186179" y="911129"/>
+          <a:ext cx="7516008" cy="3942080"/>
+        </p:xfrm>
+        <a:graphic>
+          <a:graphicData uri="http://schemas.openxmlformats.org/drawingml/2006/table">
+            <a:tbl>
+              <a:tblPr firstRow="1" bandRow="1">
+                <a:tableStyleId>{5C22544A-7EE6-4342-B048-85BDC9FD1C3A}</a:tableStyleId>
+              </a:tblPr>
+              <a:tblGrid>
+                <a:gridCol w="1367610">
+                  <a:extLst>
+                    <a:ext uri="{9D8B030D-6E8A-4147-A177-3AD203B41FA5}">
+                      <a16:colId xmlns:a16="http://schemas.microsoft.com/office/drawing/2014/main" val="2911523460"/>
+                    </a:ext>
+                  </a:extLst>
+                </a:gridCol>
+                <a:gridCol w="2606040">
+                  <a:extLst>
+                    <a:ext uri="{9D8B030D-6E8A-4147-A177-3AD203B41FA5}">
+                      <a16:colId xmlns:a16="http://schemas.microsoft.com/office/drawing/2014/main" val="4159314038"/>
+                    </a:ext>
+                  </a:extLst>
+                </a:gridCol>
+                <a:gridCol w="3542358">
+                  <a:extLst>
+                    <a:ext uri="{9D8B030D-6E8A-4147-A177-3AD203B41FA5}">
+                      <a16:colId xmlns:a16="http://schemas.microsoft.com/office/drawing/2014/main" val="2449313120"/>
+                    </a:ext>
+                  </a:extLst>
+                </a:gridCol>
+              </a:tblGrid>
+              <a:tr h="370840">
+                <a:tc>
+                  <a:txBody>
+                    <a:bodyPr/>
+                    <a:lstStyle/>
+                    <a:p>
+                      <a:r>
+                        <a:rPr lang="en-US" sz="1600" noProof="0" dirty="0"/>
+                        <a:t>Level</a:t>
+                      </a:r>
+                    </a:p>
+                  </a:txBody>
+                  <a:tcPr/>
+                </a:tc>
+                <a:tc>
+                  <a:txBody>
+                    <a:bodyPr/>
+                    <a:lstStyle/>
+                    <a:p>
+                      <a:r>
+                        <a:rPr lang="en-US" sz="1600" noProof="0" dirty="0"/>
+                        <a:t>Location</a:t>
+                      </a:r>
+                    </a:p>
+                  </a:txBody>
+                  <a:tcPr/>
+                </a:tc>
+                <a:tc>
+                  <a:txBody>
+                    <a:bodyPr/>
+                    <a:lstStyle/>
+                    <a:p>
+                      <a:r>
+                        <a:rPr lang="en-US" sz="1600" noProof="0" dirty="0"/>
+                        <a:t>Purpose</a:t>
+                      </a:r>
+                    </a:p>
+                  </a:txBody>
+                  <a:tcPr/>
+                </a:tc>
+                <a:extLst>
+                  <a:ext uri="{0D108BD9-81ED-4DB2-BD59-A6C34878D82A}">
+                    <a16:rowId xmlns:a16="http://schemas.microsoft.com/office/drawing/2014/main" val="481630875"/>
+                  </a:ext>
+                </a:extLst>
+              </a:tr>
+              <a:tr h="370840">
+                <a:tc>
+                  <a:txBody>
+                    <a:bodyPr/>
+                    <a:lstStyle/>
+                    <a:p>
+                      <a:r>
+                        <a:rPr lang="en-US" sz="1050" noProof="0" dirty="0"/>
+                        <a:t>IQ and spectral data processing</a:t>
+                      </a:r>
+                    </a:p>
+                  </a:txBody>
+                  <a:tcPr/>
+                </a:tc>
+                <a:tc>
+                  <a:txBody>
+                    <a:bodyPr/>
+                    <a:lstStyle/>
+                    <a:p>
+                      <a:r>
+                        <a:rPr lang="en-US" sz="1050" noProof="0" dirty="0"/>
+                        <a:t>retrieve/iq.py</a:t>
+                      </a:r>
+                    </a:p>
+                    <a:p>
+                      <a:r>
+                        <a:rPr lang="en-US" sz="1050" noProof="0" dirty="0"/>
+                        <a:t>retrieve/spectra.py</a:t>
+                      </a:r>
+                    </a:p>
+                  </a:txBody>
+                  <a:tcPr/>
+                </a:tc>
+                <a:tc>
+                  <a:txBody>
+                    <a:bodyPr/>
+                    <a:lstStyle/>
+                    <a:p>
+                      <a:r>
+                        <a:rPr lang="en-US" sz="1050" noProof="0" dirty="0"/>
+                        <a:t>Computation of raw moments from IQ and/or spectral data</a:t>
+                      </a:r>
+                    </a:p>
+                  </a:txBody>
+                  <a:tcPr/>
+                </a:tc>
+                <a:extLst>
+                  <a:ext uri="{0D108BD9-81ED-4DB2-BD59-A6C34878D82A}">
+                    <a16:rowId xmlns:a16="http://schemas.microsoft.com/office/drawing/2014/main" val="1583641190"/>
+                  </a:ext>
+                </a:extLst>
+              </a:tr>
+              <a:tr h="370840">
+                <a:tc>
+                  <a:txBody>
+                    <a:bodyPr/>
+                    <a:lstStyle/>
+                    <a:p>
+                      <a:r>
+                        <a:rPr lang="en-US" sz="1050" noProof="0" dirty="0"/>
+                        <a:t>Noise and bias corrections</a:t>
+                      </a:r>
+                    </a:p>
+                  </a:txBody>
+                  <a:tcPr/>
+                </a:tc>
+                <a:tc>
+                  <a:txBody>
+                    <a:bodyPr/>
+                    <a:lstStyle/>
+                    <a:p>
+                      <a:r>
+                        <a:rPr lang="en-US" sz="1050" noProof="0" dirty="0"/>
+                        <a:t>retrieve/simple_moment_calculations.py</a:t>
+                      </a:r>
+                    </a:p>
+                    <a:p>
+                      <a:r>
+                        <a:rPr lang="en-US" sz="1050" noProof="0" dirty="0"/>
+                        <a:t>correct/bias_and_noise.py</a:t>
+                      </a:r>
+                    </a:p>
+                    <a:p>
+                      <a:r>
+                        <a:rPr lang="en-US" sz="1050" noProof="0" dirty="0"/>
+                        <a:t>correct/despeckle.py</a:t>
+                      </a:r>
+                    </a:p>
+                  </a:txBody>
+                  <a:tcPr/>
+                </a:tc>
+                <a:tc>
+                  <a:txBody>
+                    <a:bodyPr/>
+                    <a:lstStyle/>
+                    <a:p>
+                      <a:r>
+                        <a:rPr lang="en-US" sz="1050" noProof="0" dirty="0"/>
+                        <a:t>Compute noise level and correct raw moments for noise and biases</a:t>
+                      </a:r>
+                    </a:p>
+                  </a:txBody>
+                  <a:tcPr/>
+                </a:tc>
+                <a:extLst>
+                  <a:ext uri="{0D108BD9-81ED-4DB2-BD59-A6C34878D82A}">
+                    <a16:rowId xmlns:a16="http://schemas.microsoft.com/office/drawing/2014/main" val="4122689824"/>
+                  </a:ext>
+                </a:extLst>
+              </a:tr>
+              <a:tr h="370840">
+                <a:tc>
+                  <a:txBody>
+                    <a:bodyPr/>
+                    <a:lstStyle/>
+                    <a:p>
+                      <a:r>
+                        <a:rPr lang="en-US" sz="1050" noProof="0" dirty="0"/>
+                        <a:t>Clutter suppression</a:t>
+                      </a:r>
+                    </a:p>
+                  </a:txBody>
+                  <a:tcPr/>
+                </a:tc>
+                <a:tc>
+                  <a:txBody>
+                    <a:bodyPr/>
+                    <a:lstStyle/>
+                    <a:p>
+                      <a:r>
+                        <a:rPr lang="en-US" sz="1050" noProof="0" dirty="0"/>
+                        <a:t>filters/gatefilter.py</a:t>
+                      </a:r>
+                    </a:p>
+                  </a:txBody>
+                  <a:tcPr/>
+                </a:tc>
+                <a:tc>
+                  <a:txBody>
+                    <a:bodyPr/>
+                    <a:lstStyle/>
+                    <a:p>
+                      <a:r>
+                        <a:rPr lang="en-US" sz="1050" noProof="0" dirty="0"/>
+                        <a:t>Mask undesired data</a:t>
+                      </a:r>
+                    </a:p>
+                  </a:txBody>
+                  <a:tcPr/>
+                </a:tc>
+                <a:extLst>
+                  <a:ext uri="{0D108BD9-81ED-4DB2-BD59-A6C34878D82A}">
+                    <a16:rowId xmlns:a16="http://schemas.microsoft.com/office/drawing/2014/main" val="4239436504"/>
+                  </a:ext>
+                </a:extLst>
+              </a:tr>
+              <a:tr h="370840">
+                <a:tc>
+                  <a:txBody>
+                    <a:bodyPr/>
+                    <a:lstStyle/>
+                    <a:p>
+                      <a:r>
+                        <a:rPr lang="en-US" sz="1050" noProof="0" dirty="0" err="1"/>
+                        <a:t>PhiDP</a:t>
+                      </a:r>
+                      <a:r>
+                        <a:rPr lang="en-US" sz="1050" noProof="0" dirty="0"/>
+                        <a:t>/KDP retrieval</a:t>
+                      </a:r>
+                    </a:p>
+                  </a:txBody>
+                  <a:tcPr/>
+                </a:tc>
+                <a:tc>
+                  <a:txBody>
+                    <a:bodyPr/>
+                    <a:lstStyle/>
+                    <a:p>
+                      <a:r>
+                        <a:rPr lang="en-US" sz="1050" noProof="0" dirty="0"/>
+                        <a:t>correct/phase_proc.py</a:t>
+                      </a:r>
+                    </a:p>
+                    <a:p>
+                      <a:r>
+                        <a:rPr lang="en-US" sz="1050" noProof="0" dirty="0"/>
+                        <a:t>retrieve/kdp_proc.py</a:t>
+                      </a:r>
+                    </a:p>
+                  </a:txBody>
+                  <a:tcPr/>
+                </a:tc>
+                <a:tc>
+                  <a:txBody>
+                    <a:bodyPr/>
+                    <a:lstStyle/>
+                    <a:p>
+                      <a:r>
+                        <a:rPr lang="en-US" sz="1050" noProof="0" dirty="0"/>
+                        <a:t>Implementation of various </a:t>
+                      </a:r>
+                      <a:r>
+                        <a:rPr lang="en-US" sz="1050" noProof="0" dirty="0" err="1"/>
+                        <a:t>PhiDP</a:t>
+                      </a:r>
+                      <a:r>
+                        <a:rPr lang="en-US" sz="1050" noProof="0" dirty="0"/>
+                        <a:t>/KDP retrieval algorithms available in literature</a:t>
+                      </a:r>
+                    </a:p>
+                  </a:txBody>
+                  <a:tcPr/>
+                </a:tc>
+                <a:extLst>
+                  <a:ext uri="{0D108BD9-81ED-4DB2-BD59-A6C34878D82A}">
+                    <a16:rowId xmlns:a16="http://schemas.microsoft.com/office/drawing/2014/main" val="3859221470"/>
+                  </a:ext>
+                </a:extLst>
+              </a:tr>
+              <a:tr h="370840">
+                <a:tc>
+                  <a:txBody>
+                    <a:bodyPr/>
+                    <a:lstStyle/>
+                    <a:p>
+                      <a:r>
+                        <a:rPr lang="en-US" sz="1050" noProof="0" dirty="0"/>
+                        <a:t>Doppler velocity unfolding</a:t>
+                      </a:r>
+                    </a:p>
+                  </a:txBody>
+                  <a:tcPr/>
+                </a:tc>
+                <a:tc>
+                  <a:txBody>
+                    <a:bodyPr/>
+                    <a:lstStyle/>
+                    <a:p>
+                      <a:r>
+                        <a:rPr lang="en-GB" sz="1050" b="0" strike="noStrike" spc="-1" dirty="0">
+                          <a:solidFill>
+                            <a:srgbClr val="000000"/>
+                          </a:solidFill>
+                          <a:latin typeface="+mn-lt"/>
+                        </a:rPr>
+                        <a:t>correct/dealias.py</a:t>
+                      </a:r>
+                    </a:p>
+                    <a:p>
+                      <a:r>
+                        <a:rPr lang="en-GB" sz="1050" b="0" strike="noStrike" spc="-1" dirty="0">
+                          <a:solidFill>
+                            <a:srgbClr val="000000"/>
+                          </a:solidFill>
+                          <a:latin typeface="+mn-lt"/>
+                        </a:rPr>
+                        <a:t>correct/region_dealias.py</a:t>
+                      </a:r>
+                    </a:p>
+                    <a:p>
+                      <a:r>
+                        <a:rPr lang="en-GB" sz="1050" b="0" strike="noStrike" spc="-1" dirty="0">
+                          <a:solidFill>
+                            <a:srgbClr val="000000"/>
+                          </a:solidFill>
+                          <a:latin typeface="+mn-lt"/>
+                        </a:rPr>
+                        <a:t>correct/unwrap.py</a:t>
+                      </a:r>
+                      <a:endParaRPr lang="en-US" sz="1050" noProof="0" dirty="0"/>
+                    </a:p>
+                  </a:txBody>
+                  <a:tcPr/>
+                </a:tc>
+                <a:tc>
+                  <a:txBody>
+                    <a:bodyPr/>
+                    <a:lstStyle/>
+                    <a:p>
+                      <a:r>
+                        <a:rPr lang="en-US" sz="1050" noProof="0" dirty="0"/>
+                        <a:t>Implementation of various unfolding techniques</a:t>
+                      </a:r>
+                    </a:p>
+                  </a:txBody>
+                  <a:tcPr/>
+                </a:tc>
+                <a:extLst>
+                  <a:ext uri="{0D108BD9-81ED-4DB2-BD59-A6C34878D82A}">
+                    <a16:rowId xmlns:a16="http://schemas.microsoft.com/office/drawing/2014/main" val="974957296"/>
+                  </a:ext>
+                </a:extLst>
+              </a:tr>
+              <a:tr h="370840">
+                <a:tc>
+                  <a:txBody>
+                    <a:bodyPr/>
+                    <a:lstStyle/>
+                    <a:p>
+                      <a:r>
+                        <a:rPr lang="en-US" sz="1050" noProof="0" dirty="0"/>
+                        <a:t>Melting layer detection</a:t>
+                      </a:r>
+                    </a:p>
+                  </a:txBody>
+                  <a:tcPr/>
+                </a:tc>
+                <a:tc>
+                  <a:txBody>
+                    <a:bodyPr/>
+                    <a:lstStyle/>
+                    <a:p>
+                      <a:r>
+                        <a:rPr lang="en-US" sz="1050" noProof="0" dirty="0"/>
+                        <a:t>retrieve/ml.py</a:t>
+                      </a:r>
+                    </a:p>
+                  </a:txBody>
+                  <a:tcPr/>
+                </a:tc>
+                <a:tc>
+                  <a:txBody>
+                    <a:bodyPr/>
+                    <a:lstStyle/>
+                    <a:p>
+                      <a:r>
+                        <a:rPr lang="en-US" sz="1050" noProof="0" dirty="0"/>
+                        <a:t>Implementation of various melting layer detection algorithms available in literature</a:t>
+                      </a:r>
+                    </a:p>
+                  </a:txBody>
+                  <a:tcPr/>
+                </a:tc>
+                <a:extLst>
+                  <a:ext uri="{0D108BD9-81ED-4DB2-BD59-A6C34878D82A}">
+                    <a16:rowId xmlns:a16="http://schemas.microsoft.com/office/drawing/2014/main" val="3995103402"/>
+                  </a:ext>
+                </a:extLst>
+              </a:tr>
+              <a:tr h="370840">
+                <a:tc>
+                  <a:txBody>
+                    <a:bodyPr/>
+                    <a:lstStyle/>
+                    <a:p>
+                      <a:r>
+                        <a:rPr lang="en-US" sz="1050" noProof="0" dirty="0"/>
+                        <a:t>Attenuation correction</a:t>
+                      </a:r>
+                    </a:p>
+                  </a:txBody>
+                  <a:tcPr/>
+                </a:tc>
+                <a:tc>
+                  <a:txBody>
+                    <a:bodyPr/>
+                    <a:lstStyle/>
+                    <a:p>
+                      <a:r>
+                        <a:rPr lang="en-US" sz="1050" noProof="0" dirty="0"/>
+                        <a:t>correct/attenuation.py</a:t>
+                      </a:r>
+                    </a:p>
+                  </a:txBody>
+                  <a:tcPr/>
+                </a:tc>
+                <a:tc>
+                  <a:txBody>
+                    <a:bodyPr/>
+                    <a:lstStyle/>
+                    <a:p>
+                      <a:r>
+                        <a:rPr lang="en-US" sz="1050" noProof="0" dirty="0"/>
+                        <a:t>Implementation of various attenuation correction algorithms available in literature</a:t>
+                      </a:r>
+                    </a:p>
+                  </a:txBody>
+                  <a:tcPr/>
+                </a:tc>
+                <a:extLst>
+                  <a:ext uri="{0D108BD9-81ED-4DB2-BD59-A6C34878D82A}">
+                    <a16:rowId xmlns:a16="http://schemas.microsoft.com/office/drawing/2014/main" val="3750585513"/>
+                  </a:ext>
+                </a:extLst>
+              </a:tr>
+              <a:tr h="370840">
+                <a:tc>
+                  <a:txBody>
+                    <a:bodyPr/>
+                    <a:lstStyle/>
+                    <a:p>
+                      <a:r>
+                        <a:rPr lang="en-US" sz="1050" noProof="0" dirty="0"/>
+                        <a:t>VPR correction</a:t>
+                      </a:r>
+                    </a:p>
+                  </a:txBody>
+                  <a:tcPr/>
+                </a:tc>
+                <a:tc>
+                  <a:txBody>
+                    <a:bodyPr/>
+                    <a:lstStyle/>
+                    <a:p>
+                      <a:r>
+                        <a:rPr lang="en-US" sz="1050" noProof="0" dirty="0"/>
+                        <a:t>correct/vpr.py</a:t>
+                      </a:r>
+                    </a:p>
+                  </a:txBody>
+                  <a:tcPr/>
+                </a:tc>
+                <a:tc>
+                  <a:txBody>
+                    <a:bodyPr/>
+                    <a:lstStyle/>
+                    <a:p>
+                      <a:r>
+                        <a:rPr lang="en-US" sz="1050" noProof="0" dirty="0"/>
+                        <a:t>Implementation of the VPR correction algorithm operational at </a:t>
+                      </a:r>
+                      <a:r>
+                        <a:rPr lang="en-US" sz="1050" noProof="0" dirty="0" err="1"/>
+                        <a:t>Météo</a:t>
+                      </a:r>
+                      <a:r>
+                        <a:rPr lang="en-US" sz="1050" noProof="0" dirty="0"/>
+                        <a:t>-France</a:t>
+                      </a:r>
+                    </a:p>
+                  </a:txBody>
+                  <a:tcPr/>
+                </a:tc>
+                <a:extLst>
+                  <a:ext uri="{0D108BD9-81ED-4DB2-BD59-A6C34878D82A}">
+                    <a16:rowId xmlns:a16="http://schemas.microsoft.com/office/drawing/2014/main" val="2567671240"/>
+                  </a:ext>
+                </a:extLst>
+              </a:tr>
+            </a:tbl>
+          </a:graphicData>
+        </a:graphic>
+      </p:graphicFrame>
+    </p:spTree>
+    <p:extLst>
+      <p:ext uri="{BB962C8B-B14F-4D97-AF65-F5344CB8AC3E}">
+        <p14:creationId xmlns:p14="http://schemas.microsoft.com/office/powerpoint/2010/main" val="4114149257"/>
+      </p:ext>
+    </p:extLst>
+  </p:cSld>
+  <p:clrMapOvr>
+    <a:masterClrMapping/>
+  </p:clrMapOvr>
+</p:sld>
+</file>
+
+<file path=ppt/slides/slide12.xml><?xml version="1.0" encoding="utf-8"?>
+<p:sld xmlns:a="http://schemas.openxmlformats.org/drawingml/2006/main" xmlns:r="http://schemas.openxmlformats.org/officeDocument/2006/relationships" xmlns:p="http://schemas.openxmlformats.org/presentationml/2006/main">
+  <p:cSld>
+    <p:spTree>
+      <p:nvGrpSpPr>
+        <p:cNvPr id="1" name=""/>
+        <p:cNvGrpSpPr/>
+        <p:nvPr/>
+      </p:nvGrpSpPr>
+      <p:grpSpPr>
+        <a:xfrm>
+          <a:off x="0" y="0"/>
+          <a:ext cx="0" cy="0"/>
+          <a:chOff x="0" y="0"/>
+          <a:chExt cx="0" cy="0"/>
+        </a:xfrm>
+      </p:grpSpPr>
+      <p:sp>
+        <p:nvSpPr>
+          <p:cNvPr id="3" name="Titre 2">
+            <a:extLst>
+              <a:ext uri="{FF2B5EF4-FFF2-40B4-BE49-F238E27FC236}">
+                <a16:creationId xmlns:a16="http://schemas.microsoft.com/office/drawing/2014/main" id="{A121A44B-BE4E-E2FD-9DCF-C1E4FC5E4D84}"/>
+              </a:ext>
+            </a:extLst>
+          </p:cNvPr>
+          <p:cNvSpPr>
+            <a:spLocks noGrp="1"/>
+          </p:cNvSpPr>
+          <p:nvPr>
+            <p:ph type="title"/>
+          </p:nvPr>
+        </p:nvSpPr>
+        <p:spPr/>
+        <p:txBody>
+          <a:bodyPr/>
+          <a:lstStyle/>
+          <a:p>
+            <a:r>
+              <a:rPr lang="fr-FR" dirty="0" err="1"/>
+              <a:t>Retrievals</a:t>
+            </a:r>
+            <a:endParaRPr lang="fr-FR" dirty="0"/>
+          </a:p>
+        </p:txBody>
+      </p:sp>
+      <p:graphicFrame>
+        <p:nvGraphicFramePr>
+          <p:cNvPr id="4" name="Tableau 4">
+            <a:extLst>
+              <a:ext uri="{FF2B5EF4-FFF2-40B4-BE49-F238E27FC236}">
+                <a16:creationId xmlns:a16="http://schemas.microsoft.com/office/drawing/2014/main" id="{7C0938DE-6AA1-B51E-94A2-2F3DA664DBB7}"/>
+              </a:ext>
+            </a:extLst>
+          </p:cNvPr>
+          <p:cNvGraphicFramePr>
+            <a:graphicFrameLocks noGrp="1"/>
+          </p:cNvGraphicFramePr>
+          <p:nvPr>
+            <p:extLst>
+              <p:ext uri="{D42A27DB-BD31-4B8C-83A1-F6EECF244321}">
+                <p14:modId xmlns:p14="http://schemas.microsoft.com/office/powerpoint/2010/main" val="2409403107"/>
+              </p:ext>
+            </p:extLst>
+          </p:nvPr>
+        </p:nvGraphicFramePr>
+        <p:xfrm>
+          <a:off x="1186179" y="1394459"/>
+          <a:ext cx="7516008" cy="1605280"/>
+        </p:xfrm>
+        <a:graphic>
+          <a:graphicData uri="http://schemas.openxmlformats.org/drawingml/2006/table">
+            <a:tbl>
+              <a:tblPr firstRow="1" bandRow="1">
+                <a:tableStyleId>{5C22544A-7EE6-4342-B048-85BDC9FD1C3A}</a:tableStyleId>
+              </a:tblPr>
+              <a:tblGrid>
+                <a:gridCol w="1367610">
+                  <a:extLst>
+                    <a:ext uri="{9D8B030D-6E8A-4147-A177-3AD203B41FA5}">
+                      <a16:colId xmlns:a16="http://schemas.microsoft.com/office/drawing/2014/main" val="2911523460"/>
+                    </a:ext>
+                  </a:extLst>
+                </a:gridCol>
+                <a:gridCol w="2606040">
+                  <a:extLst>
+                    <a:ext uri="{9D8B030D-6E8A-4147-A177-3AD203B41FA5}">
+                      <a16:colId xmlns:a16="http://schemas.microsoft.com/office/drawing/2014/main" val="4159314038"/>
+                    </a:ext>
+                  </a:extLst>
+                </a:gridCol>
+                <a:gridCol w="3542358">
+                  <a:extLst>
+                    <a:ext uri="{9D8B030D-6E8A-4147-A177-3AD203B41FA5}">
+                      <a16:colId xmlns:a16="http://schemas.microsoft.com/office/drawing/2014/main" val="2449313120"/>
+                    </a:ext>
+                  </a:extLst>
+                </a:gridCol>
+              </a:tblGrid>
+              <a:tr h="370840">
+                <a:tc>
+                  <a:txBody>
+                    <a:bodyPr/>
+                    <a:lstStyle/>
+                    <a:p>
+                      <a:r>
+                        <a:rPr lang="en-US" sz="1600" noProof="0" dirty="0"/>
+                        <a:t>Level</a:t>
+                      </a:r>
+                    </a:p>
+                  </a:txBody>
+                  <a:tcPr/>
+                </a:tc>
+                <a:tc>
+                  <a:txBody>
+                    <a:bodyPr/>
+                    <a:lstStyle/>
+                    <a:p>
+                      <a:r>
+                        <a:rPr lang="en-US" sz="1600" noProof="0" dirty="0"/>
+                        <a:t>Location</a:t>
+                      </a:r>
+                    </a:p>
+                  </a:txBody>
+                  <a:tcPr/>
+                </a:tc>
+                <a:tc>
+                  <a:txBody>
+                    <a:bodyPr/>
+                    <a:lstStyle/>
+                    <a:p>
+                      <a:r>
+                        <a:rPr lang="en-US" sz="1600" noProof="0" dirty="0"/>
+                        <a:t>Purpose</a:t>
+                      </a:r>
+                    </a:p>
+                  </a:txBody>
+                  <a:tcPr/>
+                </a:tc>
+                <a:extLst>
+                  <a:ext uri="{0D108BD9-81ED-4DB2-BD59-A6C34878D82A}">
+                    <a16:rowId xmlns:a16="http://schemas.microsoft.com/office/drawing/2014/main" val="481630875"/>
+                  </a:ext>
+                </a:extLst>
+              </a:tr>
+              <a:tr h="370840">
+                <a:tc>
+                  <a:txBody>
+                    <a:bodyPr/>
+                    <a:lstStyle/>
+                    <a:p>
+                      <a:r>
+                        <a:rPr lang="en-US" sz="1050" noProof="0" dirty="0"/>
+                        <a:t>Hydrometeor classification</a:t>
+                      </a:r>
+                    </a:p>
+                  </a:txBody>
+                  <a:tcPr/>
+                </a:tc>
+                <a:tc>
+                  <a:txBody>
+                    <a:bodyPr/>
+                    <a:lstStyle/>
+                    <a:p>
+                      <a:r>
+                        <a:rPr lang="en-US" sz="1050" noProof="0" dirty="0"/>
+                        <a:t>retrieve/echo_class.py</a:t>
+                      </a:r>
+                    </a:p>
+                  </a:txBody>
+                  <a:tcPr/>
+                </a:tc>
+                <a:tc>
+                  <a:txBody>
+                    <a:bodyPr/>
+                    <a:lstStyle/>
+                    <a:p>
+                      <a:r>
+                        <a:rPr lang="en-US" sz="1050" noProof="0" dirty="0"/>
+                        <a:t>Convective/stratiform classification and </a:t>
+                      </a:r>
+                      <a:r>
+                        <a:rPr lang="en-US" sz="1050" noProof="0" dirty="0" err="1"/>
+                        <a:t>MeteoSwiss</a:t>
+                      </a:r>
+                      <a:r>
+                        <a:rPr lang="en-US" sz="1050" noProof="0" dirty="0"/>
+                        <a:t> hydrometeor classification</a:t>
+                      </a:r>
+                    </a:p>
+                  </a:txBody>
+                  <a:tcPr/>
+                </a:tc>
+                <a:extLst>
+                  <a:ext uri="{0D108BD9-81ED-4DB2-BD59-A6C34878D82A}">
+                    <a16:rowId xmlns:a16="http://schemas.microsoft.com/office/drawing/2014/main" val="1583641190"/>
+                  </a:ext>
+                </a:extLst>
+              </a:tr>
+              <a:tr h="370840">
+                <a:tc>
+                  <a:txBody>
+                    <a:bodyPr/>
+                    <a:lstStyle/>
+                    <a:p>
+                      <a:r>
+                        <a:rPr lang="en-US" sz="1050" noProof="0" dirty="0"/>
+                        <a:t>Rainfall Rate retrieval</a:t>
+                      </a:r>
+                    </a:p>
+                  </a:txBody>
+                  <a:tcPr/>
+                </a:tc>
+                <a:tc>
+                  <a:txBody>
+                    <a:bodyPr/>
+                    <a:lstStyle/>
+                    <a:p>
+                      <a:r>
+                        <a:rPr lang="en-US" sz="1050" noProof="0" dirty="0"/>
+                        <a:t>retrieve/qpe.py</a:t>
+                      </a:r>
+                    </a:p>
+                  </a:txBody>
+                  <a:tcPr/>
+                </a:tc>
+                <a:tc>
+                  <a:txBody>
+                    <a:bodyPr/>
+                    <a:lstStyle/>
+                    <a:p>
+                      <a:r>
+                        <a:rPr lang="en-US" sz="1050" noProof="0" dirty="0"/>
+                        <a:t>Implementation of various rainfall rate retrieval algorithms</a:t>
+                      </a:r>
+                    </a:p>
+                  </a:txBody>
+                  <a:tcPr/>
+                </a:tc>
+                <a:extLst>
+                  <a:ext uri="{0D108BD9-81ED-4DB2-BD59-A6C34878D82A}">
+                    <a16:rowId xmlns:a16="http://schemas.microsoft.com/office/drawing/2014/main" val="4122689824"/>
+                  </a:ext>
+                </a:extLst>
+              </a:tr>
+              <a:tr h="370840">
+                <a:tc>
+                  <a:txBody>
+                    <a:bodyPr/>
+                    <a:lstStyle/>
+                    <a:p>
+                      <a:r>
+                        <a:rPr lang="en-US" sz="1050" noProof="0" dirty="0"/>
+                        <a:t>Wind retrievals</a:t>
+                      </a:r>
+                    </a:p>
+                  </a:txBody>
+                  <a:tcPr/>
+                </a:tc>
+                <a:tc>
+                  <a:txBody>
+                    <a:bodyPr/>
+                    <a:lstStyle/>
+                    <a:p>
+                      <a:r>
+                        <a:rPr lang="en-US" sz="1050" noProof="0" dirty="0"/>
+                        <a:t>retrieve/vad.py</a:t>
+                      </a:r>
+                    </a:p>
+                    <a:p>
+                      <a:r>
+                        <a:rPr lang="en-US" sz="1050" noProof="0" dirty="0"/>
+                        <a:t>retrieve/wind.py</a:t>
+                      </a:r>
+                    </a:p>
+                  </a:txBody>
+                  <a:tcPr/>
+                </a:tc>
+                <a:tc>
+                  <a:txBody>
+                    <a:bodyPr/>
+                    <a:lstStyle/>
+                    <a:p>
+                      <a:r>
+                        <a:rPr lang="en-US" sz="1050" noProof="0" dirty="0"/>
+                        <a:t>Wind retrievals using VAD techniques and other </a:t>
+                      </a:r>
+                    </a:p>
+                  </a:txBody>
+                  <a:tcPr/>
+                </a:tc>
+                <a:extLst>
+                  <a:ext uri="{0D108BD9-81ED-4DB2-BD59-A6C34878D82A}">
+                    <a16:rowId xmlns:a16="http://schemas.microsoft.com/office/drawing/2014/main" val="4239436504"/>
+                  </a:ext>
+                </a:extLst>
+              </a:tr>
+            </a:tbl>
+          </a:graphicData>
+        </a:graphic>
+      </p:graphicFrame>
+    </p:spTree>
+    <p:extLst>
+      <p:ext uri="{BB962C8B-B14F-4D97-AF65-F5344CB8AC3E}">
+        <p14:creationId xmlns:p14="http://schemas.microsoft.com/office/powerpoint/2010/main" val="1788497612"/>
+      </p:ext>
+    </p:extLst>
+  </p:cSld>
+  <p:clrMapOvr>
+    <a:masterClrMapping/>
+  </p:clrMapOvr>
+</p:sld>
+</file>
+
+<file path=ppt/slides/slide13.xml><?xml version="1.0" encoding="utf-8"?>
+<p:sld xmlns:a="http://schemas.openxmlformats.org/drawingml/2006/main" xmlns:r="http://schemas.openxmlformats.org/officeDocument/2006/relationships" xmlns:p="http://schemas.openxmlformats.org/presentationml/2006/main">
+  <p:cSld>
+    <p:spTree>
+      <p:nvGrpSpPr>
+        <p:cNvPr id="1" name=""/>
+        <p:cNvGrpSpPr/>
+        <p:nvPr/>
+      </p:nvGrpSpPr>
+      <p:grpSpPr>
+        <a:xfrm>
+          <a:off x="0" y="0"/>
+          <a:ext cx="0" cy="0"/>
+          <a:chOff x="0" y="0"/>
+          <a:chExt cx="0" cy="0"/>
+        </a:xfrm>
+      </p:grpSpPr>
+      <p:pic>
+        <p:nvPicPr>
+          <p:cNvPr id="257" name="Picture 44"/>
+          <p:cNvPicPr/>
+          <p:nvPr/>
+        </p:nvPicPr>
+        <p:blipFill>
+          <a:blip r:embed="rId2"/>
+          <a:stretch/>
+        </p:blipFill>
+        <p:spPr>
+          <a:xfrm>
+            <a:off x="934718" y="0"/>
+            <a:ext cx="7274446" cy="5143476"/>
+          </a:xfrm>
+          <a:prstGeom prst="rect">
+            <a:avLst/>
+          </a:prstGeom>
+          <a:ln w="0">
+            <a:noFill/>
+          </a:ln>
+        </p:spPr>
+      </p:pic>
+      <p:sp>
+        <p:nvSpPr>
+          <p:cNvPr id="259" name="Title 2"/>
+          <p:cNvSpPr/>
+          <p:nvPr/>
+        </p:nvSpPr>
+        <p:spPr>
+          <a:xfrm>
+            <a:off x="1119892" y="398516"/>
+            <a:ext cx="4949974" cy="530783"/>
+          </a:xfrm>
+          <a:prstGeom prst="rect">
+            <a:avLst/>
+          </a:prstGeom>
+          <a:noFill/>
+          <a:ln w="0">
+            <a:noFill/>
+          </a:ln>
+        </p:spPr>
+        <p:style>
+          <a:lnRef idx="0">
+            <a:scrgbClr r="0" g="0" b="0"/>
+          </a:lnRef>
+          <a:fillRef idx="0">
+            <a:scrgbClr r="0" g="0" b="0"/>
+          </a:fillRef>
+          <a:effectRef idx="0">
+            <a:scrgbClr r="0" g="0" b="0"/>
+          </a:effectRef>
+          <a:fontRef idx="minor"/>
+        </p:style>
+        <p:txBody>
+          <a:bodyPr lIns="61235" tIns="30617" rIns="61235" bIns="30617">
+            <a:noAutofit/>
+          </a:bodyPr>
+          <a:lstStyle/>
+          <a:p>
+            <a:pPr>
+              <a:lnSpc>
+                <a:spcPct val="100000"/>
+              </a:lnSpc>
+            </a:pPr>
+            <a:r>
+              <a:rPr lang="en-GB" sz="4082" b="1" spc="-1">
+                <a:solidFill>
+                  <a:srgbClr val="FFC000"/>
+                </a:solidFill>
+                <a:latin typeface="Arial"/>
+              </a:rPr>
+              <a:t>Thank you!</a:t>
+            </a:r>
+            <a:br>
+              <a:rPr sz="1429"/>
+            </a:br>
+            <a:r>
+              <a:rPr lang="en-GB" sz="4082" b="1" spc="-1">
+                <a:solidFill>
+                  <a:srgbClr val="FFC000"/>
+                </a:solidFill>
+                <a:latin typeface="Arial"/>
+              </a:rPr>
+              <a:t>Grazie mille!</a:t>
+            </a:r>
+            <a:br>
+              <a:rPr sz="1429"/>
+            </a:br>
+            <a:r>
+              <a:rPr lang="en-GB" sz="4082" b="1" spc="-1">
+                <a:solidFill>
+                  <a:srgbClr val="FFC000"/>
+                </a:solidFill>
+                <a:latin typeface="Arial"/>
+              </a:rPr>
+              <a:t>Moltes Gràcies!</a:t>
+            </a:r>
+            <a:br>
+              <a:rPr sz="1429"/>
+            </a:br>
+            <a:r>
+              <a:rPr lang="en-GB" sz="4082" b="1" spc="-1">
+                <a:solidFill>
+                  <a:srgbClr val="FFC000"/>
+                </a:solidFill>
+                <a:latin typeface="Arial"/>
+              </a:rPr>
+              <a:t>Merci!</a:t>
+            </a:r>
+            <a:endParaRPr lang="en-GB" sz="4082" spc="-1">
+              <a:latin typeface="Arial"/>
+            </a:endParaRPr>
+          </a:p>
+        </p:txBody>
+      </p:sp>
+    </p:spTree>
+    <p:extLst>
+      <p:ext uri="{BB962C8B-B14F-4D97-AF65-F5344CB8AC3E}">
+        <p14:creationId xmlns:p14="http://schemas.microsoft.com/office/powerpoint/2010/main" val="4115974886"/>
+      </p:ext>
+    </p:extLst>
+  </p:cSld>
+  <p:clrMapOvr>
+    <a:masterClrMapping/>
+  </p:clrMapOvr>
+</p:sld>
+</file>
+
+<file path=ppt/slides/slide14.xml><?xml version="1.0" encoding="utf-8"?>
+<p:sld xmlns:a="http://schemas.openxmlformats.org/drawingml/2006/main" xmlns:r="http://schemas.openxmlformats.org/officeDocument/2006/relationships" xmlns:p="http://schemas.openxmlformats.org/presentationml/2006/main">
+  <p:cSld>
+    <p:spTree>
+      <p:nvGrpSpPr>
+        <p:cNvPr id="1" name=""/>
+        <p:cNvGrpSpPr/>
+        <p:nvPr/>
+      </p:nvGrpSpPr>
+      <p:grpSpPr>
+        <a:xfrm>
+          <a:off x="0" y="0"/>
+          <a:ext cx="0" cy="0"/>
+          <a:chOff x="0" y="0"/>
+          <a:chExt cx="0" cy="0"/>
+        </a:xfrm>
+      </p:grpSpPr>
+    </p:spTree>
+    <p:extLst>
+      <p:ext uri="{BB962C8B-B14F-4D97-AF65-F5344CB8AC3E}">
+        <p14:creationId xmlns:p14="http://schemas.microsoft.com/office/powerpoint/2010/main" val="3532951394"/>
+      </p:ext>
+    </p:extLst>
+  </p:cSld>
+  <p:clrMapOvr>
+    <a:masterClrMapping/>
+  </p:clrMapOvr>
+</p:sld>
+</file>
+
+<file path=ppt/slides/slide15.xml><?xml version="1.0" encoding="utf-8"?>
+<p:sld xmlns:a="http://schemas.openxmlformats.org/drawingml/2006/main" xmlns:r="http://schemas.openxmlformats.org/officeDocument/2006/relationships" xmlns:p="http://schemas.openxmlformats.org/presentationml/2006/main">
+  <p:cSld>
+    <p:spTree>
+      <p:nvGrpSpPr>
+        <p:cNvPr id="1" name=""/>
+        <p:cNvGrpSpPr/>
+        <p:nvPr/>
+      </p:nvGrpSpPr>
+      <p:grpSpPr>
+        <a:xfrm>
+          <a:off x="0" y="0"/>
+          <a:ext cx="0" cy="0"/>
+          <a:chOff x="0" y="0"/>
+          <a:chExt cx="0" cy="0"/>
+        </a:xfrm>
+      </p:grpSpPr>
+      <p:sp>
+        <p:nvSpPr>
+          <p:cNvPr id="2" name="Sous-titre 1">
+            <a:extLst>
+              <a:ext uri="{FF2B5EF4-FFF2-40B4-BE49-F238E27FC236}">
+                <a16:creationId xmlns:a16="http://schemas.microsoft.com/office/drawing/2014/main" id="{3160BC9C-EDEF-7910-B97E-C78BCADCD2D6}"/>
+              </a:ext>
+            </a:extLst>
+          </p:cNvPr>
+          <p:cNvSpPr>
+            <a:spLocks noGrp="1"/>
+          </p:cNvSpPr>
+          <p:nvPr>
+            <p:ph type="subTitle" idx="1"/>
+          </p:nvPr>
+        </p:nvSpPr>
+        <p:spPr/>
+        <p:txBody>
+          <a:bodyPr/>
+          <a:lstStyle/>
+          <a:p>
+            <a:pPr algn="ctr"/>
+            <a:r>
+              <a:rPr lang="fr-FR" sz="5400" dirty="0"/>
+              <a:t>Appendix. Data </a:t>
+            </a:r>
+            <a:r>
+              <a:rPr lang="fr-FR" sz="5400" dirty="0" err="1"/>
+              <a:t>processing</a:t>
+            </a:r>
+            <a:r>
+              <a:rPr lang="fr-FR" sz="5400" dirty="0"/>
+              <a:t> </a:t>
+            </a:r>
+            <a:r>
+              <a:rPr lang="fr-FR" sz="5400" dirty="0" err="1"/>
+              <a:t>details</a:t>
+            </a:r>
+            <a:endParaRPr lang="fr-FR" sz="5400" dirty="0"/>
+          </a:p>
+          <a:p>
+            <a:endParaRPr lang="fr-FR" dirty="0"/>
+          </a:p>
+        </p:txBody>
+      </p:sp>
+    </p:spTree>
+    <p:extLst>
+      <p:ext uri="{BB962C8B-B14F-4D97-AF65-F5344CB8AC3E}">
+        <p14:creationId xmlns:p14="http://schemas.microsoft.com/office/powerpoint/2010/main" val="1672406780"/>
+      </p:ext>
+    </p:extLst>
+  </p:cSld>
+  <p:clrMapOvr>
+    <a:masterClrMapping/>
+  </p:clrMapOvr>
+</p:sld>
+</file>
+
+<file path=ppt/slides/slide16.xml><?xml version="1.0" encoding="utf-8"?>
+<p:sld xmlns:a="http://schemas.openxmlformats.org/drawingml/2006/main" xmlns:r="http://schemas.openxmlformats.org/officeDocument/2006/relationships" xmlns:p="http://schemas.openxmlformats.org/presentationml/2006/main">
+  <p:cSld>
+    <p:spTree>
+      <p:nvGrpSpPr>
+        <p:cNvPr id="1" name=""/>
+        <p:cNvGrpSpPr/>
+        <p:nvPr/>
+      </p:nvGrpSpPr>
+      <p:grpSpPr>
+        <a:xfrm>
+          <a:off x="0" y="0"/>
+          <a:ext cx="0" cy="0"/>
+          <a:chOff x="0" y="0"/>
+          <a:chExt cx="0" cy="0"/>
+        </a:xfrm>
+      </p:grpSpPr>
+      <p:sp>
+        <p:nvSpPr>
           <p:cNvPr id="3" name="Titre 2">
             <a:extLst>
               <a:ext uri="{FF2B5EF4-FFF2-40B4-BE49-F238E27FC236}">
@@ -5203,7 +6402,7 @@
 </p:sld>
 </file>
 
-<file path=ppt/slides/slide12.xml><?xml version="1.0" encoding="utf-8"?>
+<file path=ppt/slides/slide17.xml><?xml version="1.0" encoding="utf-8"?>
 <p:sld xmlns:a="http://schemas.openxmlformats.org/drawingml/2006/main" xmlns:r="http://schemas.openxmlformats.org/officeDocument/2006/relationships" xmlns:p="http://schemas.openxmlformats.org/presentationml/2006/main">
   <p:cSld>
     <p:spTree>
@@ -6121,7 +7320,7 @@
 </p:sld>
 </file>
 
-<file path=ppt/slides/slide13.xml><?xml version="1.0" encoding="utf-8"?>
+<file path=ppt/slides/slide18.xml><?xml version="1.0" encoding="utf-8"?>
 <p:sld xmlns:a="http://schemas.openxmlformats.org/drawingml/2006/main" xmlns:r="http://schemas.openxmlformats.org/officeDocument/2006/relationships" xmlns:p="http://schemas.openxmlformats.org/presentationml/2006/main">
   <p:cSld>
     <p:spTree>
@@ -7078,7 +8277,7 @@
 </p:sld>
 </file>
 
-<file path=ppt/slides/slide14.xml><?xml version="1.0" encoding="utf-8"?>
+<file path=ppt/slides/slide19.xml><?xml version="1.0" encoding="utf-8"?>
 <p:sld xmlns:a="http://schemas.openxmlformats.org/drawingml/2006/main" xmlns:r="http://schemas.openxmlformats.org/officeDocument/2006/relationships" xmlns:p="http://schemas.openxmlformats.org/presentationml/2006/main">
   <p:cSld>
     <p:spTree>
@@ -7177,13 +8376,7 @@
           <p:cNvGraphicFramePr>
             <a:graphicFrameLocks noGrp="1"/>
           </p:cNvGraphicFramePr>
-          <p:nvPr>
-            <p:extLst>
-              <p:ext uri="{D42A27DB-BD31-4B8C-83A1-F6EECF244321}">
-                <p14:modId xmlns:p14="http://schemas.microsoft.com/office/powerpoint/2010/main" val="3724914903"/>
-              </p:ext>
-            </p:extLst>
-          </p:nvPr>
+          <p:nvPr/>
         </p:nvGraphicFramePr>
         <p:xfrm>
           <a:off x="1179830" y="1395370"/>
@@ -7805,7 +8998,113 @@
 </p:sld>
 </file>
 
-<file path=ppt/slides/slide15.xml><?xml version="1.0" encoding="utf-8"?>
+<file path=ppt/slides/slide2.xml><?xml version="1.0" encoding="utf-8"?>
+<p:sld xmlns:a="http://schemas.openxmlformats.org/drawingml/2006/main" xmlns:r="http://schemas.openxmlformats.org/officeDocument/2006/relationships" xmlns:p="http://schemas.openxmlformats.org/presentationml/2006/main">
+  <p:cSld>
+    <p:spTree>
+      <p:nvGrpSpPr>
+        <p:cNvPr id="1" name=""/>
+        <p:cNvGrpSpPr/>
+        <p:nvPr/>
+      </p:nvGrpSpPr>
+      <p:grpSpPr>
+        <a:xfrm>
+          <a:off x="0" y="0"/>
+          <a:ext cx="0" cy="0"/>
+          <a:chOff x="0" y="0"/>
+          <a:chExt cx="0" cy="0"/>
+        </a:xfrm>
+      </p:grpSpPr>
+      <p:sp>
+        <p:nvSpPr>
+          <p:cNvPr id="3" name="Titel 2"/>
+          <p:cNvSpPr>
+            <a:spLocks noGrp="1"/>
+          </p:cNvSpPr>
+          <p:nvPr>
+            <p:ph type="title"/>
+          </p:nvPr>
+        </p:nvSpPr>
+        <p:spPr/>
+        <p:txBody>
+          <a:bodyPr/>
+          <a:lstStyle/>
+          <a:p>
+            <a:r>
+              <a:rPr lang="de-CH" dirty="0"/>
+              <a:t>Contents</a:t>
+            </a:r>
+            <a:endParaRPr lang="en-US" dirty="0"/>
+          </a:p>
+        </p:txBody>
+      </p:sp>
+      <p:sp>
+        <p:nvSpPr>
+          <p:cNvPr id="5" name="Espace réservé du texte 4">
+            <a:extLst>
+              <a:ext uri="{FF2B5EF4-FFF2-40B4-BE49-F238E27FC236}">
+                <a16:creationId xmlns:a16="http://schemas.microsoft.com/office/drawing/2014/main" id="{58E8929D-9D0C-4FC6-97C6-304FE86F9D1A}"/>
+              </a:ext>
+            </a:extLst>
+          </p:cNvPr>
+          <p:cNvSpPr>
+            <a:spLocks noGrp="1"/>
+          </p:cNvSpPr>
+          <p:nvPr>
+            <p:ph type="body" sz="quarter" idx="15"/>
+          </p:nvPr>
+        </p:nvSpPr>
+        <p:spPr/>
+        <p:txBody>
+          <a:bodyPr/>
+          <a:lstStyle/>
+          <a:p>
+            <a:r>
+              <a:rPr lang="en-US" dirty="0"/>
+              <a:t>Introduction</a:t>
+            </a:r>
+          </a:p>
+          <a:p>
+            <a:r>
+              <a:rPr lang="en-US" dirty="0" err="1"/>
+              <a:t>Py</a:t>
+            </a:r>
+            <a:r>
+              <a:rPr lang="en-US" dirty="0"/>
+              <a:t>-ART architecture</a:t>
+            </a:r>
+          </a:p>
+          <a:p>
+            <a:r>
+              <a:rPr lang="en-US" dirty="0"/>
+              <a:t>Data processing with </a:t>
+            </a:r>
+            <a:r>
+              <a:rPr lang="en-US" dirty="0" err="1"/>
+              <a:t>Py</a:t>
+            </a:r>
+            <a:r>
+              <a:rPr lang="en-US" dirty="0"/>
+              <a:t>-ART</a:t>
+            </a:r>
+            <a:endParaRPr lang="en-150" dirty="0"/>
+          </a:p>
+        </p:txBody>
+      </p:sp>
+    </p:spTree>
+    <p:extLst>
+      <p:ext uri="{BB962C8B-B14F-4D97-AF65-F5344CB8AC3E}">
+        <p14:creationId xmlns:p14="http://schemas.microsoft.com/office/powerpoint/2010/main" val="1234781282"/>
+      </p:ext>
+    </p:extLst>
+  </p:cSld>
+  <p:clrMapOvr>
+    <a:masterClrMapping/>
+  </p:clrMapOvr>
+</p:sld>
+</file>
+
+<file path=ppt/slides/slide20.xml><?xml version="1.0" encoding="utf-8"?>
 <p:sld xmlns:a="http://schemas.openxmlformats.org/drawingml/2006/main" xmlns:r="http://schemas.openxmlformats.org/officeDocument/2006/relationships" xmlns:p="http://schemas.openxmlformats.org/presentationml/2006/main">
   <p:cSld>
     <p:spTree>
@@ -8859,7 +10158,7 @@
 </p:sld>
 </file>
 
-<file path=ppt/slides/slide16.xml><?xml version="1.0" encoding="utf-8"?>
+<file path=ppt/slides/slide21.xml><?xml version="1.0" encoding="utf-8"?>
 <p:sld xmlns:a="http://schemas.openxmlformats.org/drawingml/2006/main" xmlns:r="http://schemas.openxmlformats.org/officeDocument/2006/relationships" xmlns:p="http://schemas.openxmlformats.org/presentationml/2006/main">
   <p:cSld>
     <p:spTree>
@@ -9332,7 +10631,7 @@
 </p:sld>
 </file>
 
-<file path=ppt/slides/slide17.xml><?xml version="1.0" encoding="utf-8"?>
+<file path=ppt/slides/slide22.xml><?xml version="1.0" encoding="utf-8"?>
 <p:sld xmlns:a="http://schemas.openxmlformats.org/drawingml/2006/main" xmlns:r="http://schemas.openxmlformats.org/officeDocument/2006/relationships" xmlns:p="http://schemas.openxmlformats.org/presentationml/2006/main">
   <p:cSld>
     <p:spTree>
@@ -9721,7 +11020,7 @@
 </p:sld>
 </file>
 
-<file path=ppt/slides/slide18.xml><?xml version="1.0" encoding="utf-8"?>
+<file path=ppt/slides/slide23.xml><?xml version="1.0" encoding="utf-8"?>
 <p:sld xmlns:a="http://schemas.openxmlformats.org/drawingml/2006/main" xmlns:r="http://schemas.openxmlformats.org/officeDocument/2006/relationships" xmlns:p="http://schemas.openxmlformats.org/presentationml/2006/main">
   <p:cSld>
     <p:spTree>
@@ -10045,7 +11344,7 @@
 </p:sld>
 </file>
 
-<file path=ppt/slides/slide19.xml><?xml version="1.0" encoding="utf-8"?>
+<file path=ppt/slides/slide24.xml><?xml version="1.0" encoding="utf-8"?>
 <p:sld xmlns:a="http://schemas.openxmlformats.org/drawingml/2006/main" xmlns:r="http://schemas.openxmlformats.org/officeDocument/2006/relationships" xmlns:p="http://schemas.openxmlformats.org/presentationml/2006/main">
   <p:cSld>
     <p:spTree>
@@ -10347,119 +11646,7 @@
 </p:sld>
 </file>
 
-<file path=ppt/slides/slide2.xml><?xml version="1.0" encoding="utf-8"?>
-<p:sld xmlns:a="http://schemas.openxmlformats.org/drawingml/2006/main" xmlns:r="http://schemas.openxmlformats.org/officeDocument/2006/relationships" xmlns:p="http://schemas.openxmlformats.org/presentationml/2006/main">
-  <p:cSld>
-    <p:spTree>
-      <p:nvGrpSpPr>
-        <p:cNvPr id="1" name=""/>
-        <p:cNvGrpSpPr/>
-        <p:nvPr/>
-      </p:nvGrpSpPr>
-      <p:grpSpPr>
-        <a:xfrm>
-          <a:off x="0" y="0"/>
-          <a:ext cx="0" cy="0"/>
-          <a:chOff x="0" y="0"/>
-          <a:chExt cx="0" cy="0"/>
-        </a:xfrm>
-      </p:grpSpPr>
-      <p:sp>
-        <p:nvSpPr>
-          <p:cNvPr id="3" name="Titel 2"/>
-          <p:cNvSpPr>
-            <a:spLocks noGrp="1"/>
-          </p:cNvSpPr>
-          <p:nvPr>
-            <p:ph type="title"/>
-          </p:nvPr>
-        </p:nvSpPr>
-        <p:spPr/>
-        <p:txBody>
-          <a:bodyPr/>
-          <a:lstStyle/>
-          <a:p>
-            <a:r>
-              <a:rPr lang="de-CH" dirty="0"/>
-              <a:t>Contents</a:t>
-            </a:r>
-            <a:endParaRPr lang="en-US" dirty="0"/>
-          </a:p>
-        </p:txBody>
-      </p:sp>
-      <p:sp>
-        <p:nvSpPr>
-          <p:cNvPr id="5" name="Espace réservé du texte 4">
-            <a:extLst>
-              <a:ext uri="{FF2B5EF4-FFF2-40B4-BE49-F238E27FC236}">
-                <a16:creationId xmlns:a16="http://schemas.microsoft.com/office/drawing/2014/main" id="{58E8929D-9D0C-4FC6-97C6-304FE86F9D1A}"/>
-              </a:ext>
-            </a:extLst>
-          </p:cNvPr>
-          <p:cNvSpPr>
-            <a:spLocks noGrp="1"/>
-          </p:cNvSpPr>
-          <p:nvPr>
-            <p:ph type="body" sz="quarter" idx="15"/>
-          </p:nvPr>
-        </p:nvSpPr>
-        <p:spPr/>
-        <p:txBody>
-          <a:bodyPr/>
-          <a:lstStyle/>
-          <a:p>
-            <a:r>
-              <a:rPr lang="en-US" dirty="0"/>
-              <a:t>Introduction</a:t>
-            </a:r>
-          </a:p>
-          <a:p>
-            <a:r>
-              <a:rPr lang="en-US" dirty="0" err="1"/>
-              <a:t>Py</a:t>
-            </a:r>
-            <a:r>
-              <a:rPr lang="en-US" dirty="0"/>
-              <a:t>-ART architecture</a:t>
-            </a:r>
-          </a:p>
-          <a:p>
-            <a:r>
-              <a:rPr lang="en-US" dirty="0"/>
-              <a:t>Data processing with </a:t>
-            </a:r>
-            <a:r>
-              <a:rPr lang="en-US" dirty="0" err="1"/>
-              <a:t>Py</a:t>
-            </a:r>
-            <a:r>
-              <a:rPr lang="en-US" dirty="0"/>
-              <a:t>-ART</a:t>
-            </a:r>
-          </a:p>
-          <a:p>
-            <a:r>
-              <a:rPr lang="en-US" dirty="0"/>
-              <a:t>Auxiliary processing</a:t>
-            </a:r>
-            <a:endParaRPr lang="en-150" dirty="0"/>
-          </a:p>
-        </p:txBody>
-      </p:sp>
-    </p:spTree>
-    <p:extLst>
-      <p:ext uri="{BB962C8B-B14F-4D97-AF65-F5344CB8AC3E}">
-        <p14:creationId xmlns:p14="http://schemas.microsoft.com/office/powerpoint/2010/main" val="1234781282"/>
-      </p:ext>
-    </p:extLst>
-  </p:cSld>
-  <p:clrMapOvr>
-    <a:masterClrMapping/>
-  </p:clrMapOvr>
-</p:sld>
-</file>
-
-<file path=ppt/slides/slide20.xml><?xml version="1.0" encoding="utf-8"?>
+<file path=ppt/slides/slide25.xml><?xml version="1.0" encoding="utf-8"?>
 <p:sld xmlns:a="http://schemas.openxmlformats.org/drawingml/2006/main" xmlns:r="http://schemas.openxmlformats.org/officeDocument/2006/relationships" xmlns:p="http://schemas.openxmlformats.org/presentationml/2006/main">
   <p:cSld>
     <p:spTree>
@@ -11041,7 +12228,7 @@
 </p:sld>
 </file>
 
-<file path=ppt/slides/slide21.xml><?xml version="1.0" encoding="utf-8"?>
+<file path=ppt/slides/slide26.xml><?xml version="1.0" encoding="utf-8"?>
 <p:sld xmlns:a="http://schemas.openxmlformats.org/drawingml/2006/main" xmlns:r="http://schemas.openxmlformats.org/officeDocument/2006/relationships" xmlns:p="http://schemas.openxmlformats.org/presentationml/2006/main">
   <p:cSld>
     <p:spTree>
@@ -11381,7 +12568,7 @@
 </p:sld>
 </file>
 
-<file path=ppt/slides/slide22.xml><?xml version="1.0" encoding="utf-8"?>
+<file path=ppt/slides/slide27.xml><?xml version="1.0" encoding="utf-8"?>
 <p:sld xmlns:a="http://schemas.openxmlformats.org/drawingml/2006/main" xmlns:r="http://schemas.openxmlformats.org/officeDocument/2006/relationships" xmlns:p="http://schemas.openxmlformats.org/presentationml/2006/main">
   <p:cSld>
     <p:spTree>
@@ -11446,7 +12633,7 @@
           <p:nvPr>
             <p:extLst>
               <p:ext uri="{D42A27DB-BD31-4B8C-83A1-F6EECF244321}">
-                <p14:modId xmlns:p14="http://schemas.microsoft.com/office/powerpoint/2010/main" val="2348629174"/>
+                <p14:modId xmlns:p14="http://schemas.microsoft.com/office/powerpoint/2010/main" val="2070232156"/>
               </p:ext>
             </p:extLst>
           </p:nvPr>
@@ -11766,15 +12953,51 @@
                     <a:lstStyle/>
                     <a:p>
                       <a:r>
-                        <a:rPr lang="en-GB" sz="1200" b="0" strike="noStrike" spc="-1">
+                        <a:rPr lang="en-GB" sz="1200" b="0" strike="noStrike" spc="-1" dirty="0">
                           <a:solidFill>
                             <a:srgbClr val="000000"/>
                           </a:solidFill>
                           <a:latin typeface="Arial"/>
                         </a:rPr>
-                        <a:t>Estimates wind velocity from Vr. Projects Vr into an horizontal plane (azimuthal horizontal wind) or a vertical plane (vertical wind component). Assumes the velocity in the orthogonal axis is negligible.</a:t>
-                      </a:r>
-                      <a:endParaRPr lang="fr-FR" sz="1200" b="0" strike="noStrike" spc="-1">
+                        <a:t>Estimates wind velocity from </a:t>
+                      </a:r>
+                      <a:r>
+                        <a:rPr lang="en-GB" sz="1200" b="0" strike="noStrike" spc="-1" dirty="0" err="1">
+                          <a:solidFill>
+                            <a:srgbClr val="000000"/>
+                          </a:solidFill>
+                          <a:latin typeface="Arial"/>
+                        </a:rPr>
+                        <a:t>Vr</a:t>
+                      </a:r>
+                      <a:r>
+                        <a:rPr lang="en-GB" sz="1200" b="0" strike="noStrike" spc="-1" dirty="0">
+                          <a:solidFill>
+                            <a:srgbClr val="000000"/>
+                          </a:solidFill>
+                          <a:latin typeface="Arial"/>
+                        </a:rPr>
+                        <a:t>. Projects </a:t>
+                      </a:r>
+                      <a:r>
+                        <a:rPr lang="en-GB" sz="1200" b="0" strike="noStrike" spc="-1" dirty="0" err="1">
+                          <a:solidFill>
+                            <a:srgbClr val="000000"/>
+                          </a:solidFill>
+                          <a:latin typeface="Arial"/>
+                        </a:rPr>
+                        <a:t>Vr</a:t>
+                      </a:r>
+                      <a:r>
+                        <a:rPr lang="en-GB" sz="1200" b="0" strike="noStrike" spc="-1" dirty="0">
+                          <a:solidFill>
+                            <a:srgbClr val="000000"/>
+                          </a:solidFill>
+                          <a:latin typeface="Arial"/>
+                        </a:rPr>
+                        <a:t> into a horizontal plane (azimuthal horizontal wind) or a vertical plane (vertical wind component). Assumes the velocity in the orthogonal axis is negligible.</a:t>
+                      </a:r>
+                      <a:endParaRPr lang="fr-FR" sz="1200" b="0" strike="noStrike" spc="-1" dirty="0">
                         <a:solidFill>
                           <a:srgbClr val="000000"/>
                         </a:solidFill>
@@ -11871,7 +13094,7 @@
 </p:sld>
 </file>
 
-<file path=ppt/slides/slide23.xml><?xml version="1.0" encoding="utf-8"?>
+<file path=ppt/slides/slide28.xml><?xml version="1.0" encoding="utf-8"?>
 <p:sld xmlns:a="http://schemas.openxmlformats.org/drawingml/2006/main" xmlns:r="http://schemas.openxmlformats.org/officeDocument/2006/relationships" xmlns:p="http://schemas.openxmlformats.org/presentationml/2006/main">
   <p:cSld>
     <p:spTree>
@@ -11911,10 +13134,6 @@
           <a:p>
             <a:pPr algn="ctr"/>
             <a:r>
-              <a:rPr lang="fr-FR" sz="5400" dirty="0"/>
-              <a:t>4. </a:t>
-            </a:r>
-            <a:r>
               <a:rPr lang="fr-FR" sz="5400" dirty="0" err="1"/>
               <a:t>Auxiliary</a:t>
             </a:r>
@@ -11946,7 +13165,7 @@
 </p:sld>
 </file>
 
-<file path=ppt/slides/slide24.xml><?xml version="1.0" encoding="utf-8"?>
+<file path=ppt/slides/slide29.xml><?xml version="1.0" encoding="utf-8"?>
 <p:sld xmlns:a="http://schemas.openxmlformats.org/drawingml/2006/main" xmlns:r="http://schemas.openxmlformats.org/officeDocument/2006/relationships" xmlns:p="http://schemas.openxmlformats.org/presentationml/2006/main">
   <p:cSld>
     <p:spTree>
@@ -12656,7 +13875,69 @@
 </p:sld>
 </file>
 
-<file path=ppt/slides/slide25.xml><?xml version="1.0" encoding="utf-8"?>
+<file path=ppt/slides/slide3.xml><?xml version="1.0" encoding="utf-8"?>
+<p:sld xmlns:a="http://schemas.openxmlformats.org/drawingml/2006/main" xmlns:r="http://schemas.openxmlformats.org/officeDocument/2006/relationships" xmlns:p="http://schemas.openxmlformats.org/presentationml/2006/main">
+  <p:cSld>
+    <p:spTree>
+      <p:nvGrpSpPr>
+        <p:cNvPr id="1" name=""/>
+        <p:cNvGrpSpPr/>
+        <p:nvPr/>
+      </p:nvGrpSpPr>
+      <p:grpSpPr>
+        <a:xfrm>
+          <a:off x="0" y="0"/>
+          <a:ext cx="0" cy="0"/>
+          <a:chOff x="0" y="0"/>
+          <a:chExt cx="0" cy="0"/>
+        </a:xfrm>
+      </p:grpSpPr>
+      <p:sp>
+        <p:nvSpPr>
+          <p:cNvPr id="2" name="Sous-titre 1">
+            <a:extLst>
+              <a:ext uri="{FF2B5EF4-FFF2-40B4-BE49-F238E27FC236}">
+                <a16:creationId xmlns:a16="http://schemas.microsoft.com/office/drawing/2014/main" id="{3160BC9C-EDEF-7910-B97E-C78BCADCD2D6}"/>
+              </a:ext>
+            </a:extLst>
+          </p:cNvPr>
+          <p:cNvSpPr>
+            <a:spLocks noGrp="1"/>
+          </p:cNvSpPr>
+          <p:nvPr>
+            <p:ph type="subTitle" idx="1"/>
+          </p:nvPr>
+        </p:nvSpPr>
+        <p:spPr/>
+        <p:txBody>
+          <a:bodyPr/>
+          <a:lstStyle/>
+          <a:p>
+            <a:pPr algn="ctr"/>
+            <a:r>
+              <a:rPr lang="fr-FR" sz="5400" dirty="0"/>
+              <a:t>1. Introduction</a:t>
+            </a:r>
+          </a:p>
+          <a:p>
+            <a:endParaRPr lang="fr-FR" dirty="0"/>
+          </a:p>
+        </p:txBody>
+      </p:sp>
+    </p:spTree>
+    <p:extLst>
+      <p:ext uri="{BB962C8B-B14F-4D97-AF65-F5344CB8AC3E}">
+        <p14:creationId xmlns:p14="http://schemas.microsoft.com/office/powerpoint/2010/main" val="3352772989"/>
+      </p:ext>
+    </p:extLst>
+  </p:cSld>
+  <p:clrMapOvr>
+    <a:masterClrMapping/>
+  </p:clrMapOvr>
+</p:sld>
+</file>
+
+<file path=ppt/slides/slide30.xml><?xml version="1.0" encoding="utf-8"?>
 <p:sld xmlns:a="http://schemas.openxmlformats.org/drawingml/2006/main" xmlns:r="http://schemas.openxmlformats.org/officeDocument/2006/relationships" xmlns:p="http://schemas.openxmlformats.org/presentationml/2006/main">
   <p:cSld>
     <p:spTree>
@@ -12827,7 +14108,7 @@
 </p:sld>
 </file>
 
-<file path=ppt/slides/slide26.xml><?xml version="1.0" encoding="utf-8"?>
+<file path=ppt/slides/slide31.xml><?xml version="1.0" encoding="utf-8"?>
 <p:sld xmlns:a="http://schemas.openxmlformats.org/drawingml/2006/main" xmlns:r="http://schemas.openxmlformats.org/officeDocument/2006/relationships" xmlns:p="http://schemas.openxmlformats.org/presentationml/2006/main">
   <p:cSld>
     <p:spTree>
@@ -13444,7 +14725,7 @@
 </p:sld>
 </file>
 
-<file path=ppt/slides/slide27.xml><?xml version="1.0" encoding="utf-8"?>
+<file path=ppt/slides/slide32.xml><?xml version="1.0" encoding="utf-8"?>
 <p:sld xmlns:a="http://schemas.openxmlformats.org/drawingml/2006/main" xmlns:r="http://schemas.openxmlformats.org/officeDocument/2006/relationships" xmlns:p="http://schemas.openxmlformats.org/presentationml/2006/main">
   <p:cSld>
     <p:spTree>
@@ -13549,239 +14830,6 @@
     <p:extLst>
       <p:ext uri="{BB962C8B-B14F-4D97-AF65-F5344CB8AC3E}">
         <p14:creationId xmlns:p14="http://schemas.microsoft.com/office/powerpoint/2010/main" val="1746832139"/>
-      </p:ext>
-    </p:extLst>
-  </p:cSld>
-  <p:clrMapOvr>
-    <a:masterClrMapping/>
-  </p:clrMapOvr>
-</p:sld>
-</file>
-
-<file path=ppt/slides/slide28.xml><?xml version="1.0" encoding="utf-8"?>
-<p:sld xmlns:a="http://schemas.openxmlformats.org/drawingml/2006/main" xmlns:r="http://schemas.openxmlformats.org/officeDocument/2006/relationships" xmlns:p="http://schemas.openxmlformats.org/presentationml/2006/main">
-  <p:cSld>
-    <p:spTree>
-      <p:nvGrpSpPr>
-        <p:cNvPr id="1" name=""/>
-        <p:cNvGrpSpPr/>
-        <p:nvPr/>
-      </p:nvGrpSpPr>
-      <p:grpSpPr>
-        <a:xfrm>
-          <a:off x="0" y="0"/>
-          <a:ext cx="0" cy="0"/>
-          <a:chOff x="0" y="0"/>
-          <a:chExt cx="0" cy="0"/>
-        </a:xfrm>
-      </p:grpSpPr>
-      <p:pic>
-        <p:nvPicPr>
-          <p:cNvPr id="257" name="Picture 44"/>
-          <p:cNvPicPr/>
-          <p:nvPr/>
-        </p:nvPicPr>
-        <p:blipFill>
-          <a:blip r:embed="rId2"/>
-          <a:stretch/>
-        </p:blipFill>
-        <p:spPr>
-          <a:xfrm>
-            <a:off x="934718" y="0"/>
-            <a:ext cx="7274446" cy="5143476"/>
-          </a:xfrm>
-          <a:prstGeom prst="rect">
-            <a:avLst/>
-          </a:prstGeom>
-          <a:ln w="0">
-            <a:noFill/>
-          </a:ln>
-        </p:spPr>
-      </p:pic>
-      <p:sp>
-        <p:nvSpPr>
-          <p:cNvPr id="259" name="Title 2"/>
-          <p:cNvSpPr/>
-          <p:nvPr/>
-        </p:nvSpPr>
-        <p:spPr>
-          <a:xfrm>
-            <a:off x="1119892" y="398516"/>
-            <a:ext cx="4949974" cy="530783"/>
-          </a:xfrm>
-          <a:prstGeom prst="rect">
-            <a:avLst/>
-          </a:prstGeom>
-          <a:noFill/>
-          <a:ln w="0">
-            <a:noFill/>
-          </a:ln>
-        </p:spPr>
-        <p:style>
-          <a:lnRef idx="0">
-            <a:scrgbClr r="0" g="0" b="0"/>
-          </a:lnRef>
-          <a:fillRef idx="0">
-            <a:scrgbClr r="0" g="0" b="0"/>
-          </a:fillRef>
-          <a:effectRef idx="0">
-            <a:scrgbClr r="0" g="0" b="0"/>
-          </a:effectRef>
-          <a:fontRef idx="minor"/>
-        </p:style>
-        <p:txBody>
-          <a:bodyPr lIns="61235" tIns="30617" rIns="61235" bIns="30617">
-            <a:noAutofit/>
-          </a:bodyPr>
-          <a:lstStyle/>
-          <a:p>
-            <a:pPr>
-              <a:lnSpc>
-                <a:spcPct val="100000"/>
-              </a:lnSpc>
-            </a:pPr>
-            <a:r>
-              <a:rPr lang="en-GB" sz="4082" b="1" spc="-1">
-                <a:solidFill>
-                  <a:srgbClr val="FFC000"/>
-                </a:solidFill>
-                <a:latin typeface="Arial"/>
-              </a:rPr>
-              <a:t>Thank you!</a:t>
-            </a:r>
-            <a:br>
-              <a:rPr sz="1429"/>
-            </a:br>
-            <a:r>
-              <a:rPr lang="en-GB" sz="4082" b="1" spc="-1">
-                <a:solidFill>
-                  <a:srgbClr val="FFC000"/>
-                </a:solidFill>
-                <a:latin typeface="Arial"/>
-              </a:rPr>
-              <a:t>Grazie mille!</a:t>
-            </a:r>
-            <a:br>
-              <a:rPr sz="1429"/>
-            </a:br>
-            <a:r>
-              <a:rPr lang="en-GB" sz="4082" b="1" spc="-1">
-                <a:solidFill>
-                  <a:srgbClr val="FFC000"/>
-                </a:solidFill>
-                <a:latin typeface="Arial"/>
-              </a:rPr>
-              <a:t>Moltes Gràcies!</a:t>
-            </a:r>
-            <a:br>
-              <a:rPr sz="1429"/>
-            </a:br>
-            <a:r>
-              <a:rPr lang="en-GB" sz="4082" b="1" spc="-1">
-                <a:solidFill>
-                  <a:srgbClr val="FFC000"/>
-                </a:solidFill>
-                <a:latin typeface="Arial"/>
-              </a:rPr>
-              <a:t>Merci!</a:t>
-            </a:r>
-            <a:endParaRPr lang="en-GB" sz="4082" spc="-1">
-              <a:latin typeface="Arial"/>
-            </a:endParaRPr>
-          </a:p>
-        </p:txBody>
-      </p:sp>
-    </p:spTree>
-  </p:cSld>
-  <p:clrMapOvr>
-    <a:masterClrMapping/>
-  </p:clrMapOvr>
-</p:sld>
-</file>
-
-<file path=ppt/slides/slide29.xml><?xml version="1.0" encoding="utf-8"?>
-<p:sld xmlns:a="http://schemas.openxmlformats.org/drawingml/2006/main" xmlns:r="http://schemas.openxmlformats.org/officeDocument/2006/relationships" xmlns:p="http://schemas.openxmlformats.org/presentationml/2006/main">
-  <p:cSld>
-    <p:spTree>
-      <p:nvGrpSpPr>
-        <p:cNvPr id="1" name=""/>
-        <p:cNvGrpSpPr/>
-        <p:nvPr/>
-      </p:nvGrpSpPr>
-      <p:grpSpPr>
-        <a:xfrm>
-          <a:off x="0" y="0"/>
-          <a:ext cx="0" cy="0"/>
-          <a:chOff x="0" y="0"/>
-          <a:chExt cx="0" cy="0"/>
-        </a:xfrm>
-      </p:grpSpPr>
-    </p:spTree>
-    <p:extLst>
-      <p:ext uri="{BB962C8B-B14F-4D97-AF65-F5344CB8AC3E}">
-        <p14:creationId xmlns:p14="http://schemas.microsoft.com/office/powerpoint/2010/main" val="11282309"/>
-      </p:ext>
-    </p:extLst>
-  </p:cSld>
-  <p:clrMapOvr>
-    <a:masterClrMapping/>
-  </p:clrMapOvr>
-</p:sld>
-</file>
-
-<file path=ppt/slides/slide3.xml><?xml version="1.0" encoding="utf-8"?>
-<p:sld xmlns:a="http://schemas.openxmlformats.org/drawingml/2006/main" xmlns:r="http://schemas.openxmlformats.org/officeDocument/2006/relationships" xmlns:p="http://schemas.openxmlformats.org/presentationml/2006/main">
-  <p:cSld>
-    <p:spTree>
-      <p:nvGrpSpPr>
-        <p:cNvPr id="1" name=""/>
-        <p:cNvGrpSpPr/>
-        <p:nvPr/>
-      </p:nvGrpSpPr>
-      <p:grpSpPr>
-        <a:xfrm>
-          <a:off x="0" y="0"/>
-          <a:ext cx="0" cy="0"/>
-          <a:chOff x="0" y="0"/>
-          <a:chExt cx="0" cy="0"/>
-        </a:xfrm>
-      </p:grpSpPr>
-      <p:sp>
-        <p:nvSpPr>
-          <p:cNvPr id="2" name="Sous-titre 1">
-            <a:extLst>
-              <a:ext uri="{FF2B5EF4-FFF2-40B4-BE49-F238E27FC236}">
-                <a16:creationId xmlns:a16="http://schemas.microsoft.com/office/drawing/2014/main" id="{3160BC9C-EDEF-7910-B97E-C78BCADCD2D6}"/>
-              </a:ext>
-            </a:extLst>
-          </p:cNvPr>
-          <p:cNvSpPr>
-            <a:spLocks noGrp="1"/>
-          </p:cNvSpPr>
-          <p:nvPr>
-            <p:ph type="subTitle" idx="1"/>
-          </p:nvPr>
-        </p:nvSpPr>
-        <p:spPr/>
-        <p:txBody>
-          <a:bodyPr/>
-          <a:lstStyle/>
-          <a:p>
-            <a:pPr algn="ctr"/>
-            <a:r>
-              <a:rPr lang="fr-FR" sz="5400" dirty="0"/>
-              <a:t>1. Introduction</a:t>
-            </a:r>
-          </a:p>
-          <a:p>
-            <a:endParaRPr lang="fr-FR" dirty="0"/>
-          </a:p>
-        </p:txBody>
-      </p:sp>
-    </p:spTree>
-    <p:extLst>
-      <p:ext uri="{BB962C8B-B14F-4D97-AF65-F5344CB8AC3E}">
-        <p14:creationId xmlns:p14="http://schemas.microsoft.com/office/powerpoint/2010/main" val="3352772989"/>
       </p:ext>
     </p:extLst>
   </p:cSld>
@@ -18491,6 +19539,15 @@
 </file>
 
 <file path=customXml/item1.xml><?xml version="1.0" encoding="utf-8"?>
+<p:properties xmlns:p="http://schemas.microsoft.com/office/2006/metadata/properties" xmlns:xsi="http://www.w3.org/2001/XMLSchema-instance" xmlns:pc="http://schemas.microsoft.com/office/infopath/2007/PartnerControls">
+  <documentManagement>
+    <PublishingExpirationDate xmlns="http://schemas.microsoft.com/sharepoint/v3" xsi:nil="true"/>
+    <PublishingStartDate xmlns="http://schemas.microsoft.com/sharepoint/v3" xsi:nil="true"/>
+  </documentManagement>
+</p:properties>
+</file>
+
+<file path=customXml/item2.xml><?xml version="1.0" encoding="utf-8"?>
 <ct:contentTypeSchema xmlns:ct="http://schemas.microsoft.com/office/2006/metadata/contentType" xmlns:ma="http://schemas.microsoft.com/office/2006/metadata/properties/metaAttributes" ct:_="" ma:_="" ma:contentTypeName="Dokument" ma:contentTypeID="0x0101007711EB1397DA214C991D0114E1C6705F" ma:contentTypeVersion="1" ma:contentTypeDescription="Ein neues Dokument erstellen." ma:contentTypeScope="" ma:versionID="4f497952251489acb7320a0ddcdc69ee">
   <xsd:schema xmlns:xsd="http://www.w3.org/2001/XMLSchema" xmlns:p="http://schemas.microsoft.com/office/2006/metadata/properties" xmlns:ns1="http://schemas.microsoft.com/sharepoint/v3" targetNamespace="http://schemas.microsoft.com/office/2006/metadata/properties" ma:root="true" ma:fieldsID="5e9f62132f8a72b8ccdf838efe357e29" ns1:_="">
     <xsd:import namespace="http://schemas.microsoft.com/sharepoint/v3"/>
@@ -18556,15 +19613,6 @@
 </ct:contentTypeSchema>
 </file>
 
-<file path=customXml/item2.xml><?xml version="1.0" encoding="utf-8"?>
-<p:properties xmlns:p="http://schemas.microsoft.com/office/2006/metadata/properties" xmlns:xsi="http://www.w3.org/2001/XMLSchema-instance" xmlns:pc="http://schemas.microsoft.com/office/infopath/2007/PartnerControls">
-  <documentManagement>
-    <PublishingExpirationDate xmlns="http://schemas.microsoft.com/sharepoint/v3" xsi:nil="true"/>
-    <PublishingStartDate xmlns="http://schemas.microsoft.com/sharepoint/v3" xsi:nil="true"/>
-  </documentManagement>
-</p:properties>
-</file>
-
 <file path=customXml/item3.xml><?xml version="1.0" encoding="utf-8"?>
 <?mso-contentType ?>
 <FormTemplates xmlns="http://schemas.microsoft.com/sharepoint/v3/contenttype/forms">
@@ -18575,6 +19623,22 @@
 </file>
 
 <file path=customXml/itemProps1.xml><?xml version="1.0" encoding="utf-8"?>
+<ds:datastoreItem xmlns:ds="http://schemas.openxmlformats.org/officeDocument/2006/customXml" ds:itemID="{B470CE0D-FADF-4C0F-90CA-E3B937E9A86B}">
+  <ds:schemaRefs>
+    <ds:schemaRef ds:uri="http://purl.org/dc/terms/"/>
+    <ds:schemaRef ds:uri="http://schemas.openxmlformats.org/package/2006/metadata/core-properties"/>
+    <ds:schemaRef ds:uri="http://purl.org/dc/dcmitype/"/>
+    <ds:schemaRef ds:uri="http://purl.org/dc/elements/1.1/"/>
+    <ds:schemaRef ds:uri="http://schemas.microsoft.com/office/2006/metadata/properties"/>
+    <ds:schemaRef ds:uri="http://schemas.microsoft.com/office/2006/documentManagement/types"/>
+    <ds:schemaRef ds:uri="http://schemas.microsoft.com/sharepoint/v3"/>
+    <ds:schemaRef ds:uri="http://www.w3.org/XML/1998/namespace"/>
+    <ds:schemaRef ds:uri="http://schemas.microsoft.com/office/infopath/2007/PartnerControls"/>
+  </ds:schemaRefs>
+</ds:datastoreItem>
+</file>
+
+<file path=customXml/itemProps2.xml><?xml version="1.0" encoding="utf-8"?>
 <ds:datastoreItem xmlns:ds="http://schemas.openxmlformats.org/officeDocument/2006/customXml" ds:itemID="{38F031FF-B88D-427D-A541-B3BADEC17DB4}">
   <ds:schemaRefs>
     <ds:schemaRef ds:uri="http://purl.org/dc/elements/1.1/"/>
@@ -18591,22 +19655,6 @@
 </ds:datastoreItem>
 </file>
 
-<file path=customXml/itemProps2.xml><?xml version="1.0" encoding="utf-8"?>
-<ds:datastoreItem xmlns:ds="http://schemas.openxmlformats.org/officeDocument/2006/customXml" ds:itemID="{B470CE0D-FADF-4C0F-90CA-E3B937E9A86B}">
-  <ds:schemaRefs>
-    <ds:schemaRef ds:uri="http://purl.org/dc/terms/"/>
-    <ds:schemaRef ds:uri="http://schemas.openxmlformats.org/package/2006/metadata/core-properties"/>
-    <ds:schemaRef ds:uri="http://purl.org/dc/dcmitype/"/>
-    <ds:schemaRef ds:uri="http://purl.org/dc/elements/1.1/"/>
-    <ds:schemaRef ds:uri="http://schemas.microsoft.com/office/2006/metadata/properties"/>
-    <ds:schemaRef ds:uri="http://schemas.microsoft.com/office/2006/documentManagement/types"/>
-    <ds:schemaRef ds:uri="http://schemas.microsoft.com/sharepoint/v3"/>
-    <ds:schemaRef ds:uri="http://www.w3.org/XML/1998/namespace"/>
-    <ds:schemaRef ds:uri="http://schemas.microsoft.com/office/infopath/2007/PartnerControls"/>
-  </ds:schemaRefs>
-</ds:datastoreItem>
-</file>
-
 <file path=customXml/itemProps3.xml><?xml version="1.0" encoding="utf-8"?>
 <ds:datastoreItem xmlns:ds="http://schemas.openxmlformats.org/officeDocument/2006/customXml" ds:itemID="{DEE9CD66-01A1-48D3-A44D-6CE496559473}">
   <ds:schemaRefs>

</xml_diff>